<commit_message>
added repo link to presentation
</commit_message>
<xml_diff>
--- a/PacketGuidedOptimization_Sharkfest2024_JClark.pptx
+++ b/PacketGuidedOptimization_Sharkfest2024_JClark.pptx
@@ -274,7 +274,7 @@
       <p15:sldGuideLst xmlns:p15="http://schemas.microsoft.com/office/powerpoint/2012/main"/>
     </p:ext>
     <p:ext uri="GoogleSlidesCustomDataVersion2">
-      <go:slidesCustomData xmlns:go="http://customooxmlschemas.google.com/" xmlns:ahyp="http://schemas.microsoft.com/office/drawing/2018/hyperlinkcolor" xmlns:p15="http://schemas.microsoft.com/office/powerpoint/2012/main" xmlns:p14="http://schemas.microsoft.com/office/powerpoint/2010/main" xmlns:com="http://schemas.openxmlformats.org/drawingml/2006/compatibility" xmlns:pvml="urn:schemas-microsoft-com:office:powerpoint" xmlns:v="urn:schemas-microsoft-com:vml" xmlns:o="urn:schemas-microsoft-com:office:office" xmlns:dgm="http://schemas.openxmlformats.org/drawingml/2006/diagram" xmlns:c="http://schemas.openxmlformats.org/drawingml/2006/chart" xmlns:mv="urn:schemas-microsoft-com:mac:vml" xmlns:mc="http://schemas.openxmlformats.org/markup-compatibility/2006" xmlns="" r:id="rId32" roundtripDataSignature="AMtx7mga90o+t5cU2KXXlS3PkTE3oVrXtA=="/>
+      <go:slidesCustomData xmlns="" xmlns:mc="http://schemas.openxmlformats.org/markup-compatibility/2006" xmlns:mv="urn:schemas-microsoft-com:mac:vml" xmlns:c="http://schemas.openxmlformats.org/drawingml/2006/chart" xmlns:dgm="http://schemas.openxmlformats.org/drawingml/2006/diagram" xmlns:o="urn:schemas-microsoft-com:office:office" xmlns:v="urn:schemas-microsoft-com:vml" xmlns:pvml="urn:schemas-microsoft-com:office:powerpoint" xmlns:com="http://schemas.openxmlformats.org/drawingml/2006/compatibility" xmlns:p14="http://schemas.microsoft.com/office/powerpoint/2010/main" xmlns:p15="http://schemas.microsoft.com/office/powerpoint/2012/main" xmlns:ahyp="http://schemas.microsoft.com/office/drawing/2018/hyperlinkcolor" xmlns:go="http://customooxmlschemas.google.com/" r:id="rId32" roundtripDataSignature="AMtx7mga90o+t5cU2KXXlS3PkTE3oVrXtA=="/>
     </p:ext>
   </p:extLst>
 </p:presentation>
@@ -283,13 +283,68 @@
 <file path=ppt/revisionInfo.xml><?xml version="1.0" encoding="utf-8"?>
 <p1510:revInfo xmlns:a="http://schemas.openxmlformats.org/drawingml/2006/main" xmlns:r="http://schemas.openxmlformats.org/officeDocument/2006/relationships" xmlns:p1510="http://schemas.microsoft.com/office/powerpoint/2015/10/main">
   <p1510:revLst>
-    <p1510:client id="{505B9ADC-F1BE-1343-A89C-13D405301BCC}" v="11" dt="2024-06-10T14:23:24.744"/>
+    <p1510:client id="{22D12D38-05B8-CF4A-B8C6-28B3AD3FB154}" v="4" dt="2024-06-17T13:22:45.748"/>
   </p1510:revLst>
 </p1510:revInfo>
 </file>
 
 <file path=ppt/changesInfos/changesInfo1.xml><?xml version="1.0" encoding="utf-8"?>
 <pc:chgInfo xmlns:a="http://schemas.openxmlformats.org/drawingml/2006/main" xmlns:r="http://schemas.openxmlformats.org/officeDocument/2006/relationships" xmlns:ac="http://schemas.microsoft.com/office/drawing/2013/main/command" xmlns:pc="http://schemas.microsoft.com/office/powerpoint/2013/main/command">
+  <pc:docChgLst>
+    <pc:chgData name="Josh Clark" userId="038a1c1f14b3b0b8" providerId="LiveId" clId="{22D12D38-05B8-CF4A-B8C6-28B3AD3FB154}"/>
+    <pc:docChg chg="custSel modSld">
+      <pc:chgData name="Josh Clark" userId="038a1c1f14b3b0b8" providerId="LiveId" clId="{22D12D38-05B8-CF4A-B8C6-28B3AD3FB154}" dt="2024-06-17T13:22:45.748" v="22"/>
+      <pc:docMkLst>
+        <pc:docMk/>
+      </pc:docMkLst>
+      <pc:sldChg chg="addSp delSp modSp mod">
+        <pc:chgData name="Josh Clark" userId="038a1c1f14b3b0b8" providerId="LiveId" clId="{22D12D38-05B8-CF4A-B8C6-28B3AD3FB154}" dt="2024-06-17T13:22:37.417" v="21" actId="1076"/>
+        <pc:sldMkLst>
+          <pc:docMk/>
+          <pc:sldMk cId="0" sldId="256"/>
+        </pc:sldMkLst>
+        <pc:spChg chg="add mod">
+          <ac:chgData name="Josh Clark" userId="038a1c1f14b3b0b8" providerId="LiveId" clId="{22D12D38-05B8-CF4A-B8C6-28B3AD3FB154}" dt="2024-06-17T13:22:30.665" v="20" actId="1076"/>
+          <ac:spMkLst>
+            <pc:docMk/>
+            <pc:sldMk cId="0" sldId="256"/>
+            <ac:spMk id="2" creationId="{B4E56C29-D999-9028-0636-A76B12B23738}"/>
+          </ac:spMkLst>
+        </pc:spChg>
+        <pc:spChg chg="add del mod">
+          <ac:chgData name="Josh Clark" userId="038a1c1f14b3b0b8" providerId="LiveId" clId="{22D12D38-05B8-CF4A-B8C6-28B3AD3FB154}" dt="2024-06-17T13:21:54.841" v="5"/>
+          <ac:spMkLst>
+            <pc:docMk/>
+            <pc:sldMk cId="0" sldId="256"/>
+            <ac:spMk id="3" creationId="{B1090C42-9C7E-3167-E7AF-8E1EDE1B4680}"/>
+          </ac:spMkLst>
+        </pc:spChg>
+        <pc:spChg chg="mod">
+          <ac:chgData name="Josh Clark" userId="038a1c1f14b3b0b8" providerId="LiveId" clId="{22D12D38-05B8-CF4A-B8C6-28B3AD3FB154}" dt="2024-06-17T13:22:37.417" v="21" actId="1076"/>
+          <ac:spMkLst>
+            <pc:docMk/>
+            <pc:sldMk cId="0" sldId="256"/>
+            <ac:spMk id="55" creationId="{00000000-0000-0000-0000-000000000000}"/>
+          </ac:spMkLst>
+        </pc:spChg>
+      </pc:sldChg>
+      <pc:sldChg chg="addSp modSp">
+        <pc:chgData name="Josh Clark" userId="038a1c1f14b3b0b8" providerId="LiveId" clId="{22D12D38-05B8-CF4A-B8C6-28B3AD3FB154}" dt="2024-06-17T13:22:45.748" v="22"/>
+        <pc:sldMkLst>
+          <pc:docMk/>
+          <pc:sldMk cId="3861928789" sldId="264"/>
+        </pc:sldMkLst>
+        <pc:spChg chg="add mod">
+          <ac:chgData name="Josh Clark" userId="038a1c1f14b3b0b8" providerId="LiveId" clId="{22D12D38-05B8-CF4A-B8C6-28B3AD3FB154}" dt="2024-06-17T13:22:45.748" v="22"/>
+          <ac:spMkLst>
+            <pc:docMk/>
+            <pc:sldMk cId="3861928789" sldId="264"/>
+            <ac:spMk id="2" creationId="{4718CF75-FB99-08AF-FB51-0D4EE66093D8}"/>
+          </ac:spMkLst>
+        </pc:spChg>
+      </pc:sldChg>
+    </pc:docChg>
+  </pc:docChgLst>
   <pc:docChgLst>
     <pc:chgData name="Josh Clark" userId="038a1c1f14b3b0b8" providerId="LiveId" clId="{505B9ADC-F1BE-1343-A89C-13D405301BCC}"/>
     <pc:docChg chg="undo custSel addSld delSld modSld sldOrd">
@@ -8491,7 +8546,7 @@
         </p:nvSpPr>
         <p:spPr>
           <a:xfrm>
-            <a:off x="851843" y="6889965"/>
+            <a:off x="798453" y="6248975"/>
             <a:ext cx="22787091" cy="4624702"/>
           </a:xfrm>
           <a:prstGeom prst="rect">
@@ -8668,6 +8723,122 @@
               <a:buNone/>
             </a:pPr>
             <a:endParaRPr dirty="0">
+              <a:solidFill>
+                <a:schemeClr val="accent1"/>
+              </a:solidFill>
+            </a:endParaRPr>
+          </a:p>
+        </p:txBody>
+      </p:sp>
+      <p:sp>
+        <p:nvSpPr>
+          <p:cNvPr id="2" name="Google Shape;55;p1">
+            <a:extLst>
+              <a:ext uri="{FF2B5EF4-FFF2-40B4-BE49-F238E27FC236}">
+                <a16:creationId xmlns:a16="http://schemas.microsoft.com/office/drawing/2014/main" id="{B4E56C29-D999-9028-0636-A76B12B23738}"/>
+              </a:ext>
+            </a:extLst>
+          </p:cNvPr>
+          <p:cNvSpPr txBox="1"/>
+          <p:nvPr/>
+        </p:nvSpPr>
+        <p:spPr>
+          <a:xfrm>
+            <a:off x="588306" y="10873677"/>
+            <a:ext cx="23207387" cy="1792871"/>
+          </a:xfrm>
+          <a:prstGeom prst="rect">
+            <a:avLst/>
+          </a:prstGeom>
+          <a:noFill/>
+          <a:ln>
+            <a:noFill/>
+          </a:ln>
+        </p:spPr>
+        <p:txBody>
+          <a:bodyPr spcFirstLastPara="1" wrap="square" lIns="243775" tIns="243775" rIns="243775" bIns="243775" anchor="ctr" anchorCtr="0">
+            <a:normAutofit/>
+          </a:bodyPr>
+          <a:lstStyle/>
+          <a:p>
+            <a:pPr marL="0" marR="0" lvl="0" indent="0" algn="r" rtl="0">
+              <a:lnSpc>
+                <a:spcPct val="100000"/>
+              </a:lnSpc>
+              <a:spcBef>
+                <a:spcPts val="0"/>
+              </a:spcBef>
+              <a:spcAft>
+                <a:spcPts val="0"/>
+              </a:spcAft>
+              <a:buClr>
+                <a:srgbClr val="00B400"/>
+              </a:buClr>
+              <a:buSzPts val="10000"/>
+              <a:buFont typeface="Arial"/>
+              <a:buNone/>
+            </a:pPr>
+            <a:r>
+              <a:rPr lang="en-US" sz="6000" b="1" i="0" u="none" strike="noStrike" cap="none" dirty="0">
+                <a:solidFill>
+                  <a:schemeClr val="accent1"/>
+                </a:solidFill>
+                <a:latin typeface="Arial"/>
+                <a:ea typeface="Arial"/>
+                <a:cs typeface="Arial"/>
+                <a:sym typeface="Arial"/>
+              </a:rPr>
+              <a:t>https://</a:t>
+            </a:r>
+            <a:r>
+              <a:rPr lang="en-US" sz="6000" b="1" i="0" u="none" strike="noStrike" cap="none" dirty="0" err="1">
+                <a:solidFill>
+                  <a:schemeClr val="accent1"/>
+                </a:solidFill>
+                <a:latin typeface="Arial"/>
+                <a:ea typeface="Arial"/>
+                <a:cs typeface="Arial"/>
+                <a:sym typeface="Arial"/>
+              </a:rPr>
+              <a:t>github.com</a:t>
+            </a:r>
+            <a:r>
+              <a:rPr lang="en-US" sz="6000" b="1" i="0" u="none" strike="noStrike" cap="none" dirty="0">
+                <a:solidFill>
+                  <a:schemeClr val="accent1"/>
+                </a:solidFill>
+                <a:latin typeface="Arial"/>
+                <a:ea typeface="Arial"/>
+                <a:cs typeface="Arial"/>
+                <a:sym typeface="Arial"/>
+              </a:rPr>
+              <a:t>/je-</a:t>
+            </a:r>
+            <a:r>
+              <a:rPr lang="en-US" sz="6000" b="1" i="0" u="none" strike="noStrike" cap="none" dirty="0" err="1">
+                <a:solidFill>
+                  <a:schemeClr val="accent1"/>
+                </a:solidFill>
+                <a:latin typeface="Arial"/>
+                <a:ea typeface="Arial"/>
+                <a:cs typeface="Arial"/>
+                <a:sym typeface="Arial"/>
+              </a:rPr>
+              <a:t>clark</a:t>
+            </a:r>
+            <a:r>
+              <a:rPr lang="en-US" sz="6000" b="1" i="0" u="none" strike="noStrike" cap="none" dirty="0">
+                <a:solidFill>
+                  <a:schemeClr val="accent1"/>
+                </a:solidFill>
+                <a:latin typeface="Arial"/>
+                <a:ea typeface="Arial"/>
+                <a:cs typeface="Arial"/>
+                <a:sym typeface="Arial"/>
+              </a:rPr>
+              <a:t>/sf24us_infrastructure_optimization</a:t>
+            </a:r>
+            <a:endParaRPr sz="900" dirty="0">
               <a:solidFill>
                 <a:schemeClr val="accent1"/>
               </a:solidFill>
@@ -10910,6 +11081,122 @@
               <a:t>About Me</a:t>
             </a:r>
             <a:endParaRPr dirty="0"/>
+          </a:p>
+        </p:txBody>
+      </p:sp>
+      <p:sp>
+        <p:nvSpPr>
+          <p:cNvPr id="2" name="Google Shape;55;p1">
+            <a:extLst>
+              <a:ext uri="{FF2B5EF4-FFF2-40B4-BE49-F238E27FC236}">
+                <a16:creationId xmlns:a16="http://schemas.microsoft.com/office/drawing/2014/main" id="{4718CF75-FB99-08AF-FB51-0D4EE66093D8}"/>
+              </a:ext>
+            </a:extLst>
+          </p:cNvPr>
+          <p:cNvSpPr txBox="1"/>
+          <p:nvPr/>
+        </p:nvSpPr>
+        <p:spPr>
+          <a:xfrm>
+            <a:off x="588306" y="10873677"/>
+            <a:ext cx="23207387" cy="1792871"/>
+          </a:xfrm>
+          <a:prstGeom prst="rect">
+            <a:avLst/>
+          </a:prstGeom>
+          <a:noFill/>
+          <a:ln>
+            <a:noFill/>
+          </a:ln>
+        </p:spPr>
+        <p:txBody>
+          <a:bodyPr spcFirstLastPara="1" wrap="square" lIns="243775" tIns="243775" rIns="243775" bIns="243775" anchor="ctr" anchorCtr="0">
+            <a:normAutofit/>
+          </a:bodyPr>
+          <a:lstStyle/>
+          <a:p>
+            <a:pPr marL="0" marR="0" lvl="0" indent="0" algn="r" rtl="0">
+              <a:lnSpc>
+                <a:spcPct val="100000"/>
+              </a:lnSpc>
+              <a:spcBef>
+                <a:spcPts val="0"/>
+              </a:spcBef>
+              <a:spcAft>
+                <a:spcPts val="0"/>
+              </a:spcAft>
+              <a:buClr>
+                <a:srgbClr val="00B400"/>
+              </a:buClr>
+              <a:buSzPts val="10000"/>
+              <a:buFont typeface="Arial"/>
+              <a:buNone/>
+            </a:pPr>
+            <a:r>
+              <a:rPr lang="en-US" sz="6000" b="1" i="0" u="none" strike="noStrike" cap="none" dirty="0">
+                <a:solidFill>
+                  <a:schemeClr val="accent1"/>
+                </a:solidFill>
+                <a:latin typeface="Arial"/>
+                <a:ea typeface="Arial"/>
+                <a:cs typeface="Arial"/>
+                <a:sym typeface="Arial"/>
+              </a:rPr>
+              <a:t>https://</a:t>
+            </a:r>
+            <a:r>
+              <a:rPr lang="en-US" sz="6000" b="1" i="0" u="none" strike="noStrike" cap="none" dirty="0" err="1">
+                <a:solidFill>
+                  <a:schemeClr val="accent1"/>
+                </a:solidFill>
+                <a:latin typeface="Arial"/>
+                <a:ea typeface="Arial"/>
+                <a:cs typeface="Arial"/>
+                <a:sym typeface="Arial"/>
+              </a:rPr>
+              <a:t>github.com</a:t>
+            </a:r>
+            <a:r>
+              <a:rPr lang="en-US" sz="6000" b="1" i="0" u="none" strike="noStrike" cap="none" dirty="0">
+                <a:solidFill>
+                  <a:schemeClr val="accent1"/>
+                </a:solidFill>
+                <a:latin typeface="Arial"/>
+                <a:ea typeface="Arial"/>
+                <a:cs typeface="Arial"/>
+                <a:sym typeface="Arial"/>
+              </a:rPr>
+              <a:t>/je-</a:t>
+            </a:r>
+            <a:r>
+              <a:rPr lang="en-US" sz="6000" b="1" i="0" u="none" strike="noStrike" cap="none" dirty="0" err="1">
+                <a:solidFill>
+                  <a:schemeClr val="accent1"/>
+                </a:solidFill>
+                <a:latin typeface="Arial"/>
+                <a:ea typeface="Arial"/>
+                <a:cs typeface="Arial"/>
+                <a:sym typeface="Arial"/>
+              </a:rPr>
+              <a:t>clark</a:t>
+            </a:r>
+            <a:r>
+              <a:rPr lang="en-US" sz="6000" b="1" i="0" u="none" strike="noStrike" cap="none" dirty="0">
+                <a:solidFill>
+                  <a:schemeClr val="accent1"/>
+                </a:solidFill>
+                <a:latin typeface="Arial"/>
+                <a:ea typeface="Arial"/>
+                <a:cs typeface="Arial"/>
+                <a:sym typeface="Arial"/>
+              </a:rPr>
+              <a:t>/sf24us_infrastructure_optimization</a:t>
+            </a:r>
+            <a:endParaRPr sz="900" dirty="0">
+              <a:solidFill>
+                <a:schemeClr val="accent1"/>
+              </a:solidFill>
+            </a:endParaRPr>
           </a:p>
         </p:txBody>
       </p:sp>

</xml_diff>

<commit_message>
Updated cwnd diagram to be more accurate
</commit_message>
<xml_diff>
--- a/PacketGuidedOptimization_Sharkfest2024_JClark.pptx
+++ b/PacketGuidedOptimization_Sharkfest2024_JClark.pptx
@@ -274,7 +274,7 @@
       <p15:sldGuideLst xmlns:p15="http://schemas.microsoft.com/office/powerpoint/2012/main"/>
     </p:ext>
     <p:ext uri="GoogleSlidesCustomDataVersion2">
-      <go:slidesCustomData xmlns="" xmlns:mc="http://schemas.openxmlformats.org/markup-compatibility/2006" xmlns:mv="urn:schemas-microsoft-com:mac:vml" xmlns:c="http://schemas.openxmlformats.org/drawingml/2006/chart" xmlns:dgm="http://schemas.openxmlformats.org/drawingml/2006/diagram" xmlns:o="urn:schemas-microsoft-com:office:office" xmlns:v="urn:schemas-microsoft-com:vml" xmlns:pvml="urn:schemas-microsoft-com:office:powerpoint" xmlns:com="http://schemas.openxmlformats.org/drawingml/2006/compatibility" xmlns:p14="http://schemas.microsoft.com/office/powerpoint/2010/main" xmlns:p15="http://schemas.microsoft.com/office/powerpoint/2012/main" xmlns:ahyp="http://schemas.microsoft.com/office/drawing/2018/hyperlinkcolor" xmlns:go="http://customooxmlschemas.google.com/" r:id="rId32" roundtripDataSignature="AMtx7mga90o+t5cU2KXXlS3PkTE3oVrXtA=="/>
+      <go:slidesCustomData xmlns:go="http://customooxmlschemas.google.com/" xmlns:ahyp="http://schemas.microsoft.com/office/drawing/2018/hyperlinkcolor" xmlns:p15="http://schemas.microsoft.com/office/powerpoint/2012/main" xmlns:p14="http://schemas.microsoft.com/office/powerpoint/2010/main" xmlns:com="http://schemas.openxmlformats.org/drawingml/2006/compatibility" xmlns:pvml="urn:schemas-microsoft-com:office:powerpoint" xmlns:v="urn:schemas-microsoft-com:vml" xmlns:o="urn:schemas-microsoft-com:office:office" xmlns:dgm="http://schemas.openxmlformats.org/drawingml/2006/diagram" xmlns:c="http://schemas.openxmlformats.org/drawingml/2006/chart" xmlns:mv="urn:schemas-microsoft-com:mac:vml" xmlns:mc="http://schemas.openxmlformats.org/markup-compatibility/2006" xmlns="" r:id="rId32" roundtripDataSignature="AMtx7mga90o+t5cU2KXXlS3PkTE3oVrXtA=="/>
     </p:ext>
   </p:extLst>
 </p:presentation>
@@ -283,7 +283,7 @@
 <file path=ppt/revisionInfo.xml><?xml version="1.0" encoding="utf-8"?>
 <p1510:revInfo xmlns:a="http://schemas.openxmlformats.org/drawingml/2006/main" xmlns:r="http://schemas.openxmlformats.org/officeDocument/2006/relationships" xmlns:p1510="http://schemas.microsoft.com/office/powerpoint/2015/10/main">
   <p1510:revLst>
-    <p1510:client id="{22D12D38-05B8-CF4A-B8C6-28B3AD3FB154}" v="4" dt="2024-06-17T13:22:45.748"/>
+    <p1510:client id="{22D12D38-05B8-CF4A-B8C6-28B3AD3FB154}" v="5" dt="2024-06-18T21:03:07.300"/>
   </p1510:revLst>
 </p1510:revInfo>
 </file>
@@ -293,7 +293,7 @@
   <pc:docChgLst>
     <pc:chgData name="Josh Clark" userId="038a1c1f14b3b0b8" providerId="LiveId" clId="{22D12D38-05B8-CF4A-B8C6-28B3AD3FB154}"/>
     <pc:docChg chg="custSel modSld">
-      <pc:chgData name="Josh Clark" userId="038a1c1f14b3b0b8" providerId="LiveId" clId="{22D12D38-05B8-CF4A-B8C6-28B3AD3FB154}" dt="2024-06-17T13:22:45.748" v="22"/>
+      <pc:chgData name="Josh Clark" userId="038a1c1f14b3b0b8" providerId="LiveId" clId="{22D12D38-05B8-CF4A-B8C6-28B3AD3FB154}" dt="2024-06-18T21:03:13.512" v="26" actId="1076"/>
       <pc:docMkLst>
         <pc:docMk/>
       </pc:docMkLst>
@@ -342,6 +342,29 @@
             <ac:spMk id="2" creationId="{4718CF75-FB99-08AF-FB51-0D4EE66093D8}"/>
           </ac:spMkLst>
         </pc:spChg>
+      </pc:sldChg>
+      <pc:sldChg chg="addSp delSp modSp mod">
+        <pc:chgData name="Josh Clark" userId="038a1c1f14b3b0b8" providerId="LiveId" clId="{22D12D38-05B8-CF4A-B8C6-28B3AD3FB154}" dt="2024-06-18T21:03:13.512" v="26" actId="1076"/>
+        <pc:sldMkLst>
+          <pc:docMk/>
+          <pc:sldMk cId="369981712" sldId="275"/>
+        </pc:sldMkLst>
+        <pc:picChg chg="del">
+          <ac:chgData name="Josh Clark" userId="038a1c1f14b3b0b8" providerId="LiveId" clId="{22D12D38-05B8-CF4A-B8C6-28B3AD3FB154}" dt="2024-06-18T21:03:06.505" v="23" actId="478"/>
+          <ac:picMkLst>
+            <pc:docMk/>
+            <pc:sldMk cId="369981712" sldId="275"/>
+            <ac:picMk id="2" creationId="{5FD7457E-3029-846D-CF6F-A5C64B57733D}"/>
+          </ac:picMkLst>
+        </pc:picChg>
+        <pc:picChg chg="add mod">
+          <ac:chgData name="Josh Clark" userId="038a1c1f14b3b0b8" providerId="LiveId" clId="{22D12D38-05B8-CF4A-B8C6-28B3AD3FB154}" dt="2024-06-18T21:03:13.512" v="26" actId="1076"/>
+          <ac:picMkLst>
+            <pc:docMk/>
+            <pc:sldMk cId="369981712" sldId="275"/>
+            <ac:picMk id="4" creationId="{A6B8BD56-B9C1-8C27-6D9A-E7CF3584D9CD}"/>
+          </ac:picMkLst>
+        </pc:picChg>
       </pc:sldChg>
     </pc:docChg>
   </pc:docChgLst>
@@ -14094,10 +14117,10 @@
       </p:sp>
       <p:pic>
         <p:nvPicPr>
-          <p:cNvPr id="2" name="Picture 1">
+          <p:cNvPr id="4" name="Picture 3">
             <a:extLst>
               <a:ext uri="{FF2B5EF4-FFF2-40B4-BE49-F238E27FC236}">
-                <a16:creationId xmlns:a16="http://schemas.microsoft.com/office/drawing/2014/main" id="{5FD7457E-3029-846D-CF6F-A5C64B57733D}"/>
+                <a16:creationId xmlns:a16="http://schemas.microsoft.com/office/drawing/2014/main" id="{A6B8BD56-B9C1-8C27-6D9A-E7CF3584D9CD}"/>
               </a:ext>
             </a:extLst>
           </p:cNvPr>
@@ -14114,8 +14137,8 @@
         </p:blipFill>
         <p:spPr>
           <a:xfrm>
-            <a:off x="8305800" y="3072641"/>
-            <a:ext cx="7772400" cy="8799903"/>
+            <a:off x="8192746" y="3124199"/>
+            <a:ext cx="7998508" cy="8890591"/>
           </a:xfrm>
           <a:prstGeom prst="rect">
             <a:avLst/>

</xml_diff>

<commit_message>
Updated presentation title for better understanding
</commit_message>
<xml_diff>
--- a/PacketGuidedOptimization_Sharkfest2024_JClark.pptx
+++ b/PacketGuidedOptimization_Sharkfest2024_JClark.pptx
@@ -274,7 +274,7 @@
       <p15:sldGuideLst xmlns:p15="http://schemas.microsoft.com/office/powerpoint/2012/main"/>
     </p:ext>
     <p:ext uri="GoogleSlidesCustomDataVersion2">
-      <go:slidesCustomData xmlns:go="http://customooxmlschemas.google.com/" xmlns:ahyp="http://schemas.microsoft.com/office/drawing/2018/hyperlinkcolor" xmlns:p15="http://schemas.microsoft.com/office/powerpoint/2012/main" xmlns:p14="http://schemas.microsoft.com/office/powerpoint/2010/main" xmlns:com="http://schemas.openxmlformats.org/drawingml/2006/compatibility" xmlns:pvml="urn:schemas-microsoft-com:office:powerpoint" xmlns:v="urn:schemas-microsoft-com:vml" xmlns:o="urn:schemas-microsoft-com:office:office" xmlns:dgm="http://schemas.openxmlformats.org/drawingml/2006/diagram" xmlns:c="http://schemas.openxmlformats.org/drawingml/2006/chart" xmlns:mv="urn:schemas-microsoft-com:mac:vml" xmlns:mc="http://schemas.openxmlformats.org/markup-compatibility/2006" xmlns="" r:id="rId32" roundtripDataSignature="AMtx7mga90o+t5cU2KXXlS3PkTE3oVrXtA=="/>
+      <go:slidesCustomData xmlns="" xmlns:mc="http://schemas.openxmlformats.org/markup-compatibility/2006" xmlns:mv="urn:schemas-microsoft-com:mac:vml" xmlns:c="http://schemas.openxmlformats.org/drawingml/2006/chart" xmlns:dgm="http://schemas.openxmlformats.org/drawingml/2006/diagram" xmlns:o="urn:schemas-microsoft-com:office:office" xmlns:v="urn:schemas-microsoft-com:vml" xmlns:pvml="urn:schemas-microsoft-com:office:powerpoint" xmlns:com="http://schemas.openxmlformats.org/drawingml/2006/compatibility" xmlns:p14="http://schemas.microsoft.com/office/powerpoint/2010/main" xmlns:p15="http://schemas.microsoft.com/office/powerpoint/2012/main" xmlns:ahyp="http://schemas.microsoft.com/office/drawing/2018/hyperlinkcolor" xmlns:go="http://customooxmlschemas.google.com/" r:id="rId32" roundtripDataSignature="AMtx7mga90o+t5cU2KXXlS3PkTE3oVrXtA=="/>
     </p:ext>
   </p:extLst>
 </p:presentation>
@@ -293,12 +293,12 @@
   <pc:docChgLst>
     <pc:chgData name="Josh Clark" userId="038a1c1f14b3b0b8" providerId="LiveId" clId="{22D12D38-05B8-CF4A-B8C6-28B3AD3FB154}"/>
     <pc:docChg chg="custSel modSld">
-      <pc:chgData name="Josh Clark" userId="038a1c1f14b3b0b8" providerId="LiveId" clId="{22D12D38-05B8-CF4A-B8C6-28B3AD3FB154}" dt="2024-06-18T21:03:13.512" v="26" actId="1076"/>
+      <pc:chgData name="Josh Clark" userId="038a1c1f14b3b0b8" providerId="LiveId" clId="{22D12D38-05B8-CF4A-B8C6-28B3AD3FB154}" dt="2024-06-18T21:11:41.887" v="73" actId="20577"/>
       <pc:docMkLst>
         <pc:docMk/>
       </pc:docMkLst>
       <pc:sldChg chg="addSp delSp modSp mod">
-        <pc:chgData name="Josh Clark" userId="038a1c1f14b3b0b8" providerId="LiveId" clId="{22D12D38-05B8-CF4A-B8C6-28B3AD3FB154}" dt="2024-06-17T13:22:37.417" v="21" actId="1076"/>
+        <pc:chgData name="Josh Clark" userId="038a1c1f14b3b0b8" providerId="LiveId" clId="{22D12D38-05B8-CF4A-B8C6-28B3AD3FB154}" dt="2024-06-18T21:11:41.887" v="73" actId="20577"/>
         <pc:sldMkLst>
           <pc:docMk/>
           <pc:sldMk cId="0" sldId="256"/>
@@ -325,6 +325,14 @@
             <pc:docMk/>
             <pc:sldMk cId="0" sldId="256"/>
             <ac:spMk id="55" creationId="{00000000-0000-0000-0000-000000000000}"/>
+          </ac:spMkLst>
+        </pc:spChg>
+        <pc:spChg chg="mod">
+          <ac:chgData name="Josh Clark" userId="038a1c1f14b3b0b8" providerId="LiveId" clId="{22D12D38-05B8-CF4A-B8C6-28B3AD3FB154}" dt="2024-06-18T21:11:41.887" v="73" actId="20577"/>
+          <ac:spMkLst>
+            <pc:docMk/>
+            <pc:sldMk cId="0" sldId="256"/>
+            <ac:spMk id="56" creationId="{00000000-0000-0000-0000-000000000000}"/>
           </ac:spMkLst>
         </pc:spChg>
       </pc:sldChg>
@@ -8719,7 +8727,7 @@
                 <a:cs typeface="Arial"/>
                 <a:sym typeface="Arial"/>
               </a:rPr>
-              <a:t>Packet Guided Infrastructure Optimization</a:t>
+              <a:t>Using Packets to Guide Server Optimization</a:t>
             </a:r>
             <a:endParaRPr dirty="0">
               <a:solidFill>

</xml_diff>

<commit_message>
added slide to show initcwnd setting
</commit_message>
<xml_diff>
--- a/PacketGuidedOptimization_Sharkfest2024_JClark.pptx
+++ b/PacketGuidedOptimization_Sharkfest2024_JClark.pptx
@@ -5,7 +5,7 @@
     <p:sldMasterId id="2147483648" r:id="rId1"/>
   </p:sldMasterIdLst>
   <p:notesMasterIdLst>
-    <p:notesMasterId r:id="rId31"/>
+    <p:notesMasterId r:id="rId32"/>
   </p:notesMasterIdLst>
   <p:sldIdLst>
     <p:sldId id="256" r:id="rId2"/>
@@ -32,11 +32,12 @@
     <p:sldId id="286" r:id="rId23"/>
     <p:sldId id="287" r:id="rId24"/>
     <p:sldId id="295" r:id="rId25"/>
-    <p:sldId id="288" r:id="rId26"/>
-    <p:sldId id="290" r:id="rId27"/>
-    <p:sldId id="291" r:id="rId28"/>
-    <p:sldId id="292" r:id="rId29"/>
-    <p:sldId id="263" r:id="rId30"/>
+    <p:sldId id="297" r:id="rId26"/>
+    <p:sldId id="288" r:id="rId27"/>
+    <p:sldId id="290" r:id="rId28"/>
+    <p:sldId id="291" r:id="rId29"/>
+    <p:sldId id="292" r:id="rId30"/>
+    <p:sldId id="263" r:id="rId31"/>
   </p:sldIdLst>
   <p:sldSz cx="24384000" cy="13716000"/>
   <p:notesSz cx="6858000" cy="9144000"/>
@@ -274,7 +275,7 @@
       <p15:sldGuideLst xmlns:p15="http://schemas.microsoft.com/office/powerpoint/2012/main"/>
     </p:ext>
     <p:ext uri="GoogleSlidesCustomDataVersion2">
-      <go:slidesCustomData xmlns="" xmlns:mc="http://schemas.openxmlformats.org/markup-compatibility/2006" xmlns:mv="urn:schemas-microsoft-com:mac:vml" xmlns:c="http://schemas.openxmlformats.org/drawingml/2006/chart" xmlns:dgm="http://schemas.openxmlformats.org/drawingml/2006/diagram" xmlns:o="urn:schemas-microsoft-com:office:office" xmlns:v="urn:schemas-microsoft-com:vml" xmlns:pvml="urn:schemas-microsoft-com:office:powerpoint" xmlns:com="http://schemas.openxmlformats.org/drawingml/2006/compatibility" xmlns:p14="http://schemas.microsoft.com/office/powerpoint/2010/main" xmlns:p15="http://schemas.microsoft.com/office/powerpoint/2012/main" xmlns:ahyp="http://schemas.microsoft.com/office/drawing/2018/hyperlinkcolor" xmlns:go="http://customooxmlschemas.google.com/" r:id="rId32" roundtripDataSignature="AMtx7mga90o+t5cU2KXXlS3PkTE3oVrXtA=="/>
+      <go:slidesCustomData xmlns:go="http://customooxmlschemas.google.com/" xmlns:ahyp="http://schemas.microsoft.com/office/drawing/2018/hyperlinkcolor" xmlns:p15="http://schemas.microsoft.com/office/powerpoint/2012/main" xmlns:p14="http://schemas.microsoft.com/office/powerpoint/2010/main" xmlns:com="http://schemas.openxmlformats.org/drawingml/2006/compatibility" xmlns:pvml="urn:schemas-microsoft-com:office:powerpoint" xmlns:v="urn:schemas-microsoft-com:vml" xmlns:o="urn:schemas-microsoft-com:office:office" xmlns:dgm="http://schemas.openxmlformats.org/drawingml/2006/diagram" xmlns:c="http://schemas.openxmlformats.org/drawingml/2006/chart" xmlns:mv="urn:schemas-microsoft-com:mac:vml" xmlns:mc="http://schemas.openxmlformats.org/markup-compatibility/2006" xmlns="" r:id="rId33" roundtripDataSignature="AMtx7mga90o+t5cU2KXXlS3PkTE3oVrXtA=="/>
     </p:ext>
   </p:extLst>
 </p:presentation>
@@ -283,7 +284,7 @@
 <file path=ppt/revisionInfo.xml><?xml version="1.0" encoding="utf-8"?>
 <p1510:revInfo xmlns:a="http://schemas.openxmlformats.org/drawingml/2006/main" xmlns:r="http://schemas.openxmlformats.org/officeDocument/2006/relationships" xmlns:p1510="http://schemas.microsoft.com/office/powerpoint/2015/10/main">
   <p1510:revLst>
-    <p1510:client id="{22D12D38-05B8-CF4A-B8C6-28B3AD3FB154}" v="5" dt="2024-06-18T21:03:07.300"/>
+    <p1510:client id="{22D12D38-05B8-CF4A-B8C6-28B3AD3FB154}" v="7" dt="2024-06-18T21:22:23.885"/>
   </p1510:revLst>
 </p1510:revInfo>
 </file>
@@ -292,8 +293,8 @@
 <pc:chgInfo xmlns:a="http://schemas.openxmlformats.org/drawingml/2006/main" xmlns:r="http://schemas.openxmlformats.org/officeDocument/2006/relationships" xmlns:ac="http://schemas.microsoft.com/office/drawing/2013/main/command" xmlns:pc="http://schemas.microsoft.com/office/powerpoint/2013/main/command">
   <pc:docChgLst>
     <pc:chgData name="Josh Clark" userId="038a1c1f14b3b0b8" providerId="LiveId" clId="{22D12D38-05B8-CF4A-B8C6-28B3AD3FB154}"/>
-    <pc:docChg chg="custSel modSld">
-      <pc:chgData name="Josh Clark" userId="038a1c1f14b3b0b8" providerId="LiveId" clId="{22D12D38-05B8-CF4A-B8C6-28B3AD3FB154}" dt="2024-06-18T21:11:41.887" v="73" actId="20577"/>
+    <pc:docChg chg="undo custSel addSld modSld">
+      <pc:chgData name="Josh Clark" userId="038a1c1f14b3b0b8" providerId="LiveId" clId="{22D12D38-05B8-CF4A-B8C6-28B3AD3FB154}" dt="2024-06-18T21:22:28.207" v="227" actId="1076"/>
       <pc:docMkLst>
         <pc:docMk/>
       </pc:docMkLst>
@@ -371,6 +372,69 @@
             <pc:docMk/>
             <pc:sldMk cId="369981712" sldId="275"/>
             <ac:picMk id="4" creationId="{A6B8BD56-B9C1-8C27-6D9A-E7CF3584D9CD}"/>
+          </ac:picMkLst>
+        </pc:picChg>
+      </pc:sldChg>
+      <pc:sldChg chg="addSp delSp modSp add mod">
+        <pc:chgData name="Josh Clark" userId="038a1c1f14b3b0b8" providerId="LiveId" clId="{22D12D38-05B8-CF4A-B8C6-28B3AD3FB154}" dt="2024-06-18T21:22:28.207" v="227" actId="1076"/>
+        <pc:sldMkLst>
+          <pc:docMk/>
+          <pc:sldMk cId="3225298403" sldId="297"/>
+        </pc:sldMkLst>
+        <pc:spChg chg="del">
+          <ac:chgData name="Josh Clark" userId="038a1c1f14b3b0b8" providerId="LiveId" clId="{22D12D38-05B8-CF4A-B8C6-28B3AD3FB154}" dt="2024-06-18T21:20:50.830" v="83" actId="478"/>
+          <ac:spMkLst>
+            <pc:docMk/>
+            <pc:sldMk cId="3225298403" sldId="297"/>
+            <ac:spMk id="2" creationId="{D8BA0C17-950E-36A2-1EC8-719333775367}"/>
+          </ac:spMkLst>
+        </pc:spChg>
+        <pc:spChg chg="add del">
+          <ac:chgData name="Josh Clark" userId="038a1c1f14b3b0b8" providerId="LiveId" clId="{22D12D38-05B8-CF4A-B8C6-28B3AD3FB154}" dt="2024-06-18T21:20:29.942" v="77" actId="22"/>
+          <ac:spMkLst>
+            <pc:docMk/>
+            <pc:sldMk cId="3225298403" sldId="297"/>
+            <ac:spMk id="6" creationId="{8DC2C155-0B2E-588C-442C-D4963818B7D4}"/>
+          </ac:spMkLst>
+        </pc:spChg>
+        <pc:spChg chg="add del mod">
+          <ac:chgData name="Josh Clark" userId="038a1c1f14b3b0b8" providerId="LiveId" clId="{22D12D38-05B8-CF4A-B8C6-28B3AD3FB154}" dt="2024-06-18T21:20:54.315" v="84" actId="478"/>
+          <ac:spMkLst>
+            <pc:docMk/>
+            <pc:sldMk cId="3225298403" sldId="297"/>
+            <ac:spMk id="10" creationId="{DC8E4D6D-1C35-7A78-12BE-6DFAE7D864D0}"/>
+          </ac:spMkLst>
+        </pc:spChg>
+        <pc:spChg chg="add mod">
+          <ac:chgData name="Josh Clark" userId="038a1c1f14b3b0b8" providerId="LiveId" clId="{22D12D38-05B8-CF4A-B8C6-28B3AD3FB154}" dt="2024-06-18T21:22:14.290" v="225" actId="1037"/>
+          <ac:spMkLst>
+            <pc:docMk/>
+            <pc:sldMk cId="3225298403" sldId="297"/>
+            <ac:spMk id="11" creationId="{1244673A-0961-69D2-58E9-22675784907C}"/>
+          </ac:spMkLst>
+        </pc:spChg>
+        <pc:spChg chg="add mod">
+          <ac:chgData name="Josh Clark" userId="038a1c1f14b3b0b8" providerId="LiveId" clId="{22D12D38-05B8-CF4A-B8C6-28B3AD3FB154}" dt="2024-06-18T21:22:28.207" v="227" actId="1076"/>
+          <ac:spMkLst>
+            <pc:docMk/>
+            <pc:sldMk cId="3225298403" sldId="297"/>
+            <ac:spMk id="12" creationId="{484865F4-A9AF-54D1-9CF7-2CB8D0B1E4A9}"/>
+          </ac:spMkLst>
+        </pc:spChg>
+        <pc:picChg chg="del">
+          <ac:chgData name="Josh Clark" userId="038a1c1f14b3b0b8" providerId="LiveId" clId="{22D12D38-05B8-CF4A-B8C6-28B3AD3FB154}" dt="2024-06-18T21:20:26.538" v="75" actId="478"/>
+          <ac:picMkLst>
+            <pc:docMk/>
+            <pc:sldMk cId="3225298403" sldId="297"/>
+            <ac:picMk id="4" creationId="{7CBA50E6-83E5-2500-9F12-45549A50F815}"/>
+          </ac:picMkLst>
+        </pc:picChg>
+        <pc:picChg chg="add mod modCrop">
+          <ac:chgData name="Josh Clark" userId="038a1c1f14b3b0b8" providerId="LiveId" clId="{22D12D38-05B8-CF4A-B8C6-28B3AD3FB154}" dt="2024-06-18T21:21:11.559" v="88" actId="732"/>
+          <ac:picMkLst>
+            <pc:docMk/>
+            <pc:sldMk cId="3225298403" sldId="297"/>
+            <ac:picMk id="8" creationId="{F9A0E5C7-104C-7D37-2642-9E1982D05910}"/>
           </ac:picMkLst>
         </pc:picChg>
       </pc:sldChg>
@@ -11971,6 +12035,196 @@
   <p:cSld>
     <p:spTree>
       <p:nvGrpSpPr>
+        <p:cNvPr id="1" name=""/>
+        <p:cNvGrpSpPr/>
+        <p:nvPr/>
+      </p:nvGrpSpPr>
+      <p:grpSpPr>
+        <a:xfrm>
+          <a:off x="0" y="0"/>
+          <a:ext cx="0" cy="0"/>
+          <a:chOff x="0" y="0"/>
+          <a:chExt cx="0" cy="0"/>
+        </a:xfrm>
+      </p:grpSpPr>
+      <p:sp>
+        <p:nvSpPr>
+          <p:cNvPr id="3" name="Title 2">
+            <a:extLst>
+              <a:ext uri="{FF2B5EF4-FFF2-40B4-BE49-F238E27FC236}">
+                <a16:creationId xmlns:a16="http://schemas.microsoft.com/office/drawing/2014/main" id="{B87A3C61-F3DA-3C99-750E-CD22224AB1F7}"/>
+              </a:ext>
+            </a:extLst>
+          </p:cNvPr>
+          <p:cNvSpPr>
+            <a:spLocks noGrp="1"/>
+          </p:cNvSpPr>
+          <p:nvPr>
+            <p:ph type="title"/>
+          </p:nvPr>
+        </p:nvSpPr>
+        <p:spPr/>
+        <p:txBody>
+          <a:bodyPr/>
+          <a:lstStyle/>
+          <a:p>
+            <a:r>
+              <a:rPr lang="en-US" dirty="0" err="1"/>
+              <a:t>Init_cwnd</a:t>
+            </a:r>
+            <a:endParaRPr lang="en-US" dirty="0"/>
+          </a:p>
+        </p:txBody>
+      </p:sp>
+      <p:pic>
+        <p:nvPicPr>
+          <p:cNvPr id="8" name="Picture 7" descr="A white background with black text&#10;&#10;Description automatically generated">
+            <a:extLst>
+              <a:ext uri="{FF2B5EF4-FFF2-40B4-BE49-F238E27FC236}">
+                <a16:creationId xmlns:a16="http://schemas.microsoft.com/office/drawing/2014/main" id="{F9A0E5C7-104C-7D37-2642-9E1982D05910}"/>
+              </a:ext>
+            </a:extLst>
+          </p:cNvPr>
+          <p:cNvPicPr>
+            <a:picLocks noChangeAspect="1"/>
+          </p:cNvPicPr>
+          <p:nvPr/>
+        </p:nvPicPr>
+        <p:blipFill rotWithShape="1">
+          <a:blip r:embed="rId2"/>
+          <a:srcRect t="2757" b="5880"/>
+          <a:stretch/>
+        </p:blipFill>
+        <p:spPr>
+          <a:xfrm>
+            <a:off x="953101" y="4997301"/>
+            <a:ext cx="22477797" cy="4295555"/>
+          </a:xfrm>
+          <a:prstGeom prst="rect">
+            <a:avLst/>
+          </a:prstGeom>
+        </p:spPr>
+      </p:pic>
+      <p:sp>
+        <p:nvSpPr>
+          <p:cNvPr id="11" name="Rounded Rectangle 10">
+            <a:extLst>
+              <a:ext uri="{FF2B5EF4-FFF2-40B4-BE49-F238E27FC236}">
+                <a16:creationId xmlns:a16="http://schemas.microsoft.com/office/drawing/2014/main" id="{1244673A-0961-69D2-58E9-22675784907C}"/>
+              </a:ext>
+            </a:extLst>
+          </p:cNvPr>
+          <p:cNvSpPr/>
+          <p:nvPr/>
+        </p:nvSpPr>
+        <p:spPr>
+          <a:xfrm>
+            <a:off x="6373155" y="7123814"/>
+            <a:ext cx="3083442" cy="574158"/>
+          </a:xfrm>
+          <a:prstGeom prst="roundRect">
+            <a:avLst/>
+          </a:prstGeom>
+          <a:solidFill>
+            <a:srgbClr val="FFFF00">
+              <a:alpha val="66000"/>
+            </a:srgbClr>
+          </a:solidFill>
+        </p:spPr>
+        <p:style>
+          <a:lnRef idx="2">
+            <a:schemeClr val="accent1">
+              <a:shade val="50000"/>
+            </a:schemeClr>
+          </a:lnRef>
+          <a:fillRef idx="1">
+            <a:schemeClr val="accent1"/>
+          </a:fillRef>
+          <a:effectRef idx="0">
+            <a:schemeClr val="accent1"/>
+          </a:effectRef>
+          <a:fontRef idx="minor">
+            <a:schemeClr val="lt1"/>
+          </a:fontRef>
+        </p:style>
+        <p:txBody>
+          <a:bodyPr rtlCol="0" anchor="ctr"/>
+          <a:lstStyle/>
+          <a:p>
+            <a:pPr algn="ctr"/>
+            <a:endParaRPr lang="en-US"/>
+          </a:p>
+        </p:txBody>
+      </p:sp>
+      <p:sp>
+        <p:nvSpPr>
+          <p:cNvPr id="12" name="Rounded Rectangle 11">
+            <a:extLst>
+              <a:ext uri="{FF2B5EF4-FFF2-40B4-BE49-F238E27FC236}">
+                <a16:creationId xmlns:a16="http://schemas.microsoft.com/office/drawing/2014/main" id="{484865F4-A9AF-54D1-9CF7-2CB8D0B1E4A9}"/>
+              </a:ext>
+            </a:extLst>
+          </p:cNvPr>
+          <p:cNvSpPr/>
+          <p:nvPr/>
+        </p:nvSpPr>
+        <p:spPr>
+          <a:xfrm>
+            <a:off x="19532895" y="8190614"/>
+            <a:ext cx="3083442" cy="574158"/>
+          </a:xfrm>
+          <a:prstGeom prst="roundRect">
+            <a:avLst/>
+          </a:prstGeom>
+          <a:solidFill>
+            <a:srgbClr val="FFFF00">
+              <a:alpha val="66000"/>
+            </a:srgbClr>
+          </a:solidFill>
+        </p:spPr>
+        <p:style>
+          <a:lnRef idx="2">
+            <a:schemeClr val="accent1">
+              <a:shade val="50000"/>
+            </a:schemeClr>
+          </a:lnRef>
+          <a:fillRef idx="1">
+            <a:schemeClr val="accent1"/>
+          </a:fillRef>
+          <a:effectRef idx="0">
+            <a:schemeClr val="accent1"/>
+          </a:effectRef>
+          <a:fontRef idx="minor">
+            <a:schemeClr val="lt1"/>
+          </a:fontRef>
+        </p:style>
+        <p:txBody>
+          <a:bodyPr rtlCol="0" anchor="ctr"/>
+          <a:lstStyle/>
+          <a:p>
+            <a:pPr algn="ctr"/>
+            <a:endParaRPr lang="en-US"/>
+          </a:p>
+        </p:txBody>
+      </p:sp>
+    </p:spTree>
+    <p:extLst>
+      <p:ext uri="{BB962C8B-B14F-4D97-AF65-F5344CB8AC3E}">
+        <p14:creationId xmlns:p14="http://schemas.microsoft.com/office/powerpoint/2010/main" val="3225298403"/>
+      </p:ext>
+    </p:extLst>
+  </p:cSld>
+  <p:clrMapOvr>
+    <a:masterClrMapping/>
+  </p:clrMapOvr>
+</p:sld>
+</file>
+
+<file path=ppt/slides/slide26.xml><?xml version="1.0" encoding="utf-8"?>
+<p:sld xmlns:a="http://schemas.openxmlformats.org/drawingml/2006/main" xmlns:r="http://schemas.openxmlformats.org/officeDocument/2006/relationships" xmlns:p="http://schemas.openxmlformats.org/presentationml/2006/main">
+  <p:cSld>
+    <p:spTree>
+      <p:nvGrpSpPr>
         <p:cNvPr id="1" name="Shape 72"/>
         <p:cNvGrpSpPr/>
         <p:nvPr/>
@@ -12113,7 +12367,7 @@
 </p:sld>
 </file>
 
-<file path=ppt/slides/slide26.xml><?xml version="1.0" encoding="utf-8"?>
+<file path=ppt/slides/slide27.xml><?xml version="1.0" encoding="utf-8"?>
 <p:sld xmlns:a="http://schemas.openxmlformats.org/drawingml/2006/main" xmlns:r="http://schemas.openxmlformats.org/officeDocument/2006/relationships" xmlns:p="http://schemas.openxmlformats.org/presentationml/2006/main">
   <p:cSld>
     <p:spTree>
@@ -12318,7 +12572,7 @@
 </p:sld>
 </file>
 
-<file path=ppt/slides/slide27.xml><?xml version="1.0" encoding="utf-8"?>
+<file path=ppt/slides/slide28.xml><?xml version="1.0" encoding="utf-8"?>
 <p:sld xmlns:a="http://schemas.openxmlformats.org/drawingml/2006/main" xmlns:r="http://schemas.openxmlformats.org/officeDocument/2006/relationships" xmlns:p="http://schemas.openxmlformats.org/presentationml/2006/main">
   <p:cSld>
     <p:spTree>
@@ -12523,7 +12777,7 @@
 </p:sld>
 </file>
 
-<file path=ppt/slides/slide28.xml><?xml version="1.0" encoding="utf-8"?>
+<file path=ppt/slides/slide29.xml><?xml version="1.0" encoding="utf-8"?>
 <p:sld xmlns:a="http://schemas.openxmlformats.org/drawingml/2006/main" xmlns:r="http://schemas.openxmlformats.org/officeDocument/2006/relationships" xmlns:p="http://schemas.openxmlformats.org/presentationml/2006/main">
   <p:cSld>
     <p:spTree>
@@ -12728,161 +12982,6 @@
 </p:sld>
 </file>
 
-<file path=ppt/slides/slide29.xml><?xml version="1.0" encoding="utf-8"?>
-<p:sld xmlns:a="http://schemas.openxmlformats.org/drawingml/2006/main" xmlns:r="http://schemas.openxmlformats.org/officeDocument/2006/relationships" xmlns:p="http://schemas.openxmlformats.org/presentationml/2006/main">
-  <p:cSld>
-    <p:spTree>
-      <p:nvGrpSpPr>
-        <p:cNvPr id="1" name="Shape 95"/>
-        <p:cNvGrpSpPr/>
-        <p:nvPr/>
-      </p:nvGrpSpPr>
-      <p:grpSpPr>
-        <a:xfrm>
-          <a:off x="0" y="0"/>
-          <a:ext cx="0" cy="0"/>
-          <a:chOff x="0" y="0"/>
-          <a:chExt cx="0" cy="0"/>
-        </a:xfrm>
-      </p:grpSpPr>
-      <p:sp>
-        <p:nvSpPr>
-          <p:cNvPr id="96" name="Google Shape;96;p8"/>
-          <p:cNvSpPr txBox="1"/>
-          <p:nvPr/>
-        </p:nvSpPr>
-        <p:spPr>
-          <a:xfrm>
-            <a:off x="15114509" y="11024718"/>
-            <a:ext cx="7841898" cy="2264208"/>
-          </a:xfrm>
-          <a:prstGeom prst="rect">
-            <a:avLst/>
-          </a:prstGeom>
-          <a:noFill/>
-          <a:ln>
-            <a:noFill/>
-          </a:ln>
-        </p:spPr>
-        <p:txBody>
-          <a:bodyPr spcFirstLastPara="1" wrap="square" lIns="121900" tIns="121900" rIns="121900" bIns="121900" anchor="t" anchorCtr="0">
-            <a:spAutoFit/>
-          </a:bodyPr>
-          <a:lstStyle/>
-          <a:p>
-            <a:pPr marL="0" marR="0" lvl="0" indent="0" algn="ctr" rtl="0">
-              <a:lnSpc>
-                <a:spcPct val="100000"/>
-              </a:lnSpc>
-              <a:spcBef>
-                <a:spcPts val="0"/>
-              </a:spcBef>
-              <a:spcAft>
-                <a:spcPts val="0"/>
-              </a:spcAft>
-              <a:buClr>
-                <a:srgbClr val="000000"/>
-              </a:buClr>
-              <a:buSzPts val="2800"/>
-              <a:buFont typeface="Arial"/>
-              <a:buNone/>
-            </a:pPr>
-            <a:r>
-              <a:rPr lang="en-US" sz="2800" b="1" i="0" u="none" strike="noStrike" cap="none" dirty="0">
-                <a:solidFill>
-                  <a:srgbClr val="000000"/>
-                </a:solidFill>
-                <a:latin typeface="Arial"/>
-                <a:ea typeface="Arial"/>
-                <a:cs typeface="Arial"/>
-                <a:sym typeface="Arial"/>
-              </a:rPr>
-              <a:t>Generated with Microsoft Designer AI</a:t>
-            </a:r>
-            <a:endParaRPr dirty="0"/>
-          </a:p>
-          <a:p>
-            <a:pPr marL="0" marR="0" lvl="0" indent="0" algn="ctr" rtl="0">
-              <a:lnSpc>
-                <a:spcPct val="100000"/>
-              </a:lnSpc>
-              <a:spcBef>
-                <a:spcPts val="0"/>
-              </a:spcBef>
-              <a:spcAft>
-                <a:spcPts val="0"/>
-              </a:spcAft>
-              <a:buClr>
-                <a:srgbClr val="000000"/>
-              </a:buClr>
-              <a:buSzPts val="13800"/>
-              <a:buFont typeface="Arial"/>
-              <a:buNone/>
-            </a:pPr>
-            <a:endParaRPr sz="13800" b="1" i="0" u="none" strike="noStrike" cap="none" dirty="0">
-              <a:solidFill>
-                <a:srgbClr val="FEFDFA"/>
-              </a:solidFill>
-              <a:latin typeface="Arial"/>
-              <a:ea typeface="Arial"/>
-              <a:cs typeface="Arial"/>
-              <a:sym typeface="Arial"/>
-            </a:endParaRPr>
-          </a:p>
-          <a:p>
-            <a:pPr marL="0" marR="0" lvl="0" indent="0" algn="ctr" rtl="0">
-              <a:lnSpc>
-                <a:spcPct val="100000"/>
-              </a:lnSpc>
-              <a:spcBef>
-                <a:spcPts val="0"/>
-              </a:spcBef>
-              <a:spcAft>
-                <a:spcPts val="0"/>
-              </a:spcAft>
-              <a:buClr>
-                <a:srgbClr val="000000"/>
-              </a:buClr>
-              <a:buSzPts val="2800"/>
-              <a:buFont typeface="Arial"/>
-              <a:buNone/>
-            </a:pPr>
-            <a:r>
-              <a:rPr lang="en-US" sz="2800" b="1" i="0" u="none" strike="noStrike" cap="none" dirty="0">
-                <a:solidFill>
-                  <a:srgbClr val="000000"/>
-                </a:solidFill>
-                <a:latin typeface="Arial"/>
-                <a:ea typeface="Arial"/>
-                <a:cs typeface="Arial"/>
-                <a:sym typeface="Arial"/>
-              </a:rPr>
-              <a:t>Prompt: </a:t>
-            </a:r>
-            <a:r>
-              <a:rPr lang="en-US" sz="2800" b="0" i="0" u="none" strike="noStrike" cap="none" dirty="0">
-                <a:solidFill>
-                  <a:srgbClr val="000000"/>
-                </a:solidFill>
-                <a:latin typeface="Arial"/>
-                <a:ea typeface="Arial"/>
-                <a:cs typeface="Arial"/>
-                <a:sym typeface="Arial"/>
-              </a:rPr>
-              <a:t>Great white shark, standing at a podium with a laptop. The laptop has stickers on it. Darker blue ocean background.</a:t>
-            </a:r>
-            <a:endParaRPr dirty="0"/>
-          </a:p>
-        </p:txBody>
-      </p:sp>
-    </p:spTree>
-  </p:cSld>
-  <p:clrMapOvr>
-    <a:masterClrMapping/>
-  </p:clrMapOvr>
-</p:sld>
-</file>
-
 <file path=ppt/slides/slide3.xml><?xml version="1.0" encoding="utf-8"?>
 <p:sld xmlns:a="http://schemas.openxmlformats.org/drawingml/2006/main" xmlns:r="http://schemas.openxmlformats.org/officeDocument/2006/relationships" xmlns:p="http://schemas.openxmlformats.org/presentationml/2006/main">
   <p:cSld>
@@ -13582,6 +13681,161 @@
         <p14:creationId xmlns:p14="http://schemas.microsoft.com/office/powerpoint/2010/main" val="734761223"/>
       </p:ext>
     </p:extLst>
+  </p:cSld>
+  <p:clrMapOvr>
+    <a:masterClrMapping/>
+  </p:clrMapOvr>
+</p:sld>
+</file>
+
+<file path=ppt/slides/slide30.xml><?xml version="1.0" encoding="utf-8"?>
+<p:sld xmlns:a="http://schemas.openxmlformats.org/drawingml/2006/main" xmlns:r="http://schemas.openxmlformats.org/officeDocument/2006/relationships" xmlns:p="http://schemas.openxmlformats.org/presentationml/2006/main">
+  <p:cSld>
+    <p:spTree>
+      <p:nvGrpSpPr>
+        <p:cNvPr id="1" name="Shape 95"/>
+        <p:cNvGrpSpPr/>
+        <p:nvPr/>
+      </p:nvGrpSpPr>
+      <p:grpSpPr>
+        <a:xfrm>
+          <a:off x="0" y="0"/>
+          <a:ext cx="0" cy="0"/>
+          <a:chOff x="0" y="0"/>
+          <a:chExt cx="0" cy="0"/>
+        </a:xfrm>
+      </p:grpSpPr>
+      <p:sp>
+        <p:nvSpPr>
+          <p:cNvPr id="96" name="Google Shape;96;p8"/>
+          <p:cNvSpPr txBox="1"/>
+          <p:nvPr/>
+        </p:nvSpPr>
+        <p:spPr>
+          <a:xfrm>
+            <a:off x="15114509" y="11024718"/>
+            <a:ext cx="7841898" cy="2264208"/>
+          </a:xfrm>
+          <a:prstGeom prst="rect">
+            <a:avLst/>
+          </a:prstGeom>
+          <a:noFill/>
+          <a:ln>
+            <a:noFill/>
+          </a:ln>
+        </p:spPr>
+        <p:txBody>
+          <a:bodyPr spcFirstLastPara="1" wrap="square" lIns="121900" tIns="121900" rIns="121900" bIns="121900" anchor="t" anchorCtr="0">
+            <a:spAutoFit/>
+          </a:bodyPr>
+          <a:lstStyle/>
+          <a:p>
+            <a:pPr marL="0" marR="0" lvl="0" indent="0" algn="ctr" rtl="0">
+              <a:lnSpc>
+                <a:spcPct val="100000"/>
+              </a:lnSpc>
+              <a:spcBef>
+                <a:spcPts val="0"/>
+              </a:spcBef>
+              <a:spcAft>
+                <a:spcPts val="0"/>
+              </a:spcAft>
+              <a:buClr>
+                <a:srgbClr val="000000"/>
+              </a:buClr>
+              <a:buSzPts val="2800"/>
+              <a:buFont typeface="Arial"/>
+              <a:buNone/>
+            </a:pPr>
+            <a:r>
+              <a:rPr lang="en-US" sz="2800" b="1" i="0" u="none" strike="noStrike" cap="none" dirty="0">
+                <a:solidFill>
+                  <a:srgbClr val="000000"/>
+                </a:solidFill>
+                <a:latin typeface="Arial"/>
+                <a:ea typeface="Arial"/>
+                <a:cs typeface="Arial"/>
+                <a:sym typeface="Arial"/>
+              </a:rPr>
+              <a:t>Generated with Microsoft Designer AI</a:t>
+            </a:r>
+            <a:endParaRPr dirty="0"/>
+          </a:p>
+          <a:p>
+            <a:pPr marL="0" marR="0" lvl="0" indent="0" algn="ctr" rtl="0">
+              <a:lnSpc>
+                <a:spcPct val="100000"/>
+              </a:lnSpc>
+              <a:spcBef>
+                <a:spcPts val="0"/>
+              </a:spcBef>
+              <a:spcAft>
+                <a:spcPts val="0"/>
+              </a:spcAft>
+              <a:buClr>
+                <a:srgbClr val="000000"/>
+              </a:buClr>
+              <a:buSzPts val="13800"/>
+              <a:buFont typeface="Arial"/>
+              <a:buNone/>
+            </a:pPr>
+            <a:endParaRPr sz="13800" b="1" i="0" u="none" strike="noStrike" cap="none" dirty="0">
+              <a:solidFill>
+                <a:srgbClr val="FEFDFA"/>
+              </a:solidFill>
+              <a:latin typeface="Arial"/>
+              <a:ea typeface="Arial"/>
+              <a:cs typeface="Arial"/>
+              <a:sym typeface="Arial"/>
+            </a:endParaRPr>
+          </a:p>
+          <a:p>
+            <a:pPr marL="0" marR="0" lvl="0" indent="0" algn="ctr" rtl="0">
+              <a:lnSpc>
+                <a:spcPct val="100000"/>
+              </a:lnSpc>
+              <a:spcBef>
+                <a:spcPts val="0"/>
+              </a:spcBef>
+              <a:spcAft>
+                <a:spcPts val="0"/>
+              </a:spcAft>
+              <a:buClr>
+                <a:srgbClr val="000000"/>
+              </a:buClr>
+              <a:buSzPts val="2800"/>
+              <a:buFont typeface="Arial"/>
+              <a:buNone/>
+            </a:pPr>
+            <a:r>
+              <a:rPr lang="en-US" sz="2800" b="1" i="0" u="none" strike="noStrike" cap="none" dirty="0">
+                <a:solidFill>
+                  <a:srgbClr val="000000"/>
+                </a:solidFill>
+                <a:latin typeface="Arial"/>
+                <a:ea typeface="Arial"/>
+                <a:cs typeface="Arial"/>
+                <a:sym typeface="Arial"/>
+              </a:rPr>
+              <a:t>Prompt: </a:t>
+            </a:r>
+            <a:r>
+              <a:rPr lang="en-US" sz="2800" b="0" i="0" u="none" strike="noStrike" cap="none" dirty="0">
+                <a:solidFill>
+                  <a:srgbClr val="000000"/>
+                </a:solidFill>
+                <a:latin typeface="Arial"/>
+                <a:ea typeface="Arial"/>
+                <a:cs typeface="Arial"/>
+                <a:sym typeface="Arial"/>
+              </a:rPr>
+              <a:t>Great white shark, standing at a podium with a laptop. The laptop has stickers on it. Darker blue ocean background.</a:t>
+            </a:r>
+            <a:endParaRPr dirty="0"/>
+          </a:p>
+        </p:txBody>
+      </p:sp>
+    </p:spTree>
   </p:cSld>
   <p:clrMapOvr>
     <a:masterClrMapping/>

</xml_diff>

<commit_message>
added google meet link to presentation slides
</commit_message>
<xml_diff>
--- a/PacketGuidedOptimization_Sharkfest2024_JClark.pptx
+++ b/PacketGuidedOptimization_Sharkfest2024_JClark.pptx
@@ -275,7 +275,7 @@
       <p15:sldGuideLst xmlns:p15="http://schemas.microsoft.com/office/powerpoint/2012/main"/>
     </p:ext>
     <p:ext uri="GoogleSlidesCustomDataVersion2">
-      <go:slidesCustomData xmlns:go="http://customooxmlschemas.google.com/" xmlns:ahyp="http://schemas.microsoft.com/office/drawing/2018/hyperlinkcolor" xmlns:p15="http://schemas.microsoft.com/office/powerpoint/2012/main" xmlns:p14="http://schemas.microsoft.com/office/powerpoint/2010/main" xmlns:com="http://schemas.openxmlformats.org/drawingml/2006/compatibility" xmlns:pvml="urn:schemas-microsoft-com:office:powerpoint" xmlns:v="urn:schemas-microsoft-com:vml" xmlns:o="urn:schemas-microsoft-com:office:office" xmlns:dgm="http://schemas.openxmlformats.org/drawingml/2006/diagram" xmlns:c="http://schemas.openxmlformats.org/drawingml/2006/chart" xmlns:mv="urn:schemas-microsoft-com:mac:vml" xmlns:mc="http://schemas.openxmlformats.org/markup-compatibility/2006" xmlns="" r:id="rId33" roundtripDataSignature="AMtx7mga90o+t5cU2KXXlS3PkTE3oVrXtA=="/>
+      <go:slidesCustomData xmlns="" xmlns:mc="http://schemas.openxmlformats.org/markup-compatibility/2006" xmlns:mv="urn:schemas-microsoft-com:mac:vml" xmlns:c="http://schemas.openxmlformats.org/drawingml/2006/chart" xmlns:dgm="http://schemas.openxmlformats.org/drawingml/2006/diagram" xmlns:o="urn:schemas-microsoft-com:office:office" xmlns:v="urn:schemas-microsoft-com:vml" xmlns:pvml="urn:schemas-microsoft-com:office:powerpoint" xmlns:com="http://schemas.openxmlformats.org/drawingml/2006/compatibility" xmlns:p14="http://schemas.microsoft.com/office/powerpoint/2010/main" xmlns:p15="http://schemas.microsoft.com/office/powerpoint/2012/main" xmlns:ahyp="http://schemas.microsoft.com/office/drawing/2018/hyperlinkcolor" xmlns:go="http://customooxmlschemas.google.com/" r:id="rId33" roundtripDataSignature="AMtx7mga90o+t5cU2KXXlS3PkTE3oVrXtA=="/>
     </p:ext>
   </p:extLst>
 </p:presentation>
@@ -284,7 +284,7 @@
 <file path=ppt/revisionInfo.xml><?xml version="1.0" encoding="utf-8"?>
 <p1510:revInfo xmlns:a="http://schemas.openxmlformats.org/drawingml/2006/main" xmlns:r="http://schemas.openxmlformats.org/officeDocument/2006/relationships" xmlns:p1510="http://schemas.microsoft.com/office/powerpoint/2015/10/main">
   <p1510:revLst>
-    <p1510:client id="{22D12D38-05B8-CF4A-B8C6-28B3AD3FB154}" v="7" dt="2024-06-18T21:22:23.885"/>
+    <p1510:client id="{22D12D38-05B8-CF4A-B8C6-28B3AD3FB154}" v="11" dt="2024-06-19T14:12:46.004"/>
   </p1510:revLst>
 </p1510:revInfo>
 </file>
@@ -294,22 +294,30 @@
   <pc:docChgLst>
     <pc:chgData name="Josh Clark" userId="038a1c1f14b3b0b8" providerId="LiveId" clId="{22D12D38-05B8-CF4A-B8C6-28B3AD3FB154}"/>
     <pc:docChg chg="undo custSel addSld modSld">
-      <pc:chgData name="Josh Clark" userId="038a1c1f14b3b0b8" providerId="LiveId" clId="{22D12D38-05B8-CF4A-B8C6-28B3AD3FB154}" dt="2024-06-18T21:22:28.207" v="227" actId="1076"/>
+      <pc:chgData name="Josh Clark" userId="038a1c1f14b3b0b8" providerId="LiveId" clId="{22D12D38-05B8-CF4A-B8C6-28B3AD3FB154}" dt="2024-06-19T14:12:48.622" v="331" actId="1035"/>
       <pc:docMkLst>
         <pc:docMk/>
       </pc:docMkLst>
       <pc:sldChg chg="addSp delSp modSp mod">
-        <pc:chgData name="Josh Clark" userId="038a1c1f14b3b0b8" providerId="LiveId" clId="{22D12D38-05B8-CF4A-B8C6-28B3AD3FB154}" dt="2024-06-18T21:11:41.887" v="73" actId="20577"/>
+        <pc:chgData name="Josh Clark" userId="038a1c1f14b3b0b8" providerId="LiveId" clId="{22D12D38-05B8-CF4A-B8C6-28B3AD3FB154}" dt="2024-06-19T14:12:31.550" v="300" actId="1035"/>
         <pc:sldMkLst>
           <pc:docMk/>
           <pc:sldMk cId="0" sldId="256"/>
         </pc:sldMkLst>
         <pc:spChg chg="add mod">
-          <ac:chgData name="Josh Clark" userId="038a1c1f14b3b0b8" providerId="LiveId" clId="{22D12D38-05B8-CF4A-B8C6-28B3AD3FB154}" dt="2024-06-17T13:22:30.665" v="20" actId="1076"/>
+          <ac:chgData name="Josh Clark" userId="038a1c1f14b3b0b8" providerId="LiveId" clId="{22D12D38-05B8-CF4A-B8C6-28B3AD3FB154}" dt="2024-06-19T14:12:31.550" v="300" actId="1035"/>
           <ac:spMkLst>
             <pc:docMk/>
             <pc:sldMk cId="0" sldId="256"/>
             <ac:spMk id="2" creationId="{B4E56C29-D999-9028-0636-A76B12B23738}"/>
+          </ac:spMkLst>
+        </pc:spChg>
+        <pc:spChg chg="add mod">
+          <ac:chgData name="Josh Clark" userId="038a1c1f14b3b0b8" providerId="LiveId" clId="{22D12D38-05B8-CF4A-B8C6-28B3AD3FB154}" dt="2024-06-19T14:12:26.762" v="288" actId="20577"/>
+          <ac:spMkLst>
+            <pc:docMk/>
+            <pc:sldMk cId="0" sldId="256"/>
+            <ac:spMk id="3" creationId="{AF5C6C2C-2BC2-7F40-14E7-FB47D2ACBB4E}"/>
           </ac:spMkLst>
         </pc:spChg>
         <pc:spChg chg="add del mod">
@@ -318,6 +326,14 @@
             <pc:docMk/>
             <pc:sldMk cId="0" sldId="256"/>
             <ac:spMk id="3" creationId="{B1090C42-9C7E-3167-E7AF-8E1EDE1B4680}"/>
+          </ac:spMkLst>
+        </pc:spChg>
+        <pc:spChg chg="add del mod">
+          <ac:chgData name="Josh Clark" userId="038a1c1f14b3b0b8" providerId="LiveId" clId="{22D12D38-05B8-CF4A-B8C6-28B3AD3FB154}" dt="2024-06-19T14:11:55.875" v="280"/>
+          <ac:spMkLst>
+            <pc:docMk/>
+            <pc:sldMk cId="0" sldId="256"/>
+            <ac:spMk id="4" creationId="{C2064A4C-E565-D303-E9DA-CD4EA74711AE}"/>
           </ac:spMkLst>
         </pc:spChg>
         <pc:spChg chg="mod">
@@ -337,18 +353,26 @@
           </ac:spMkLst>
         </pc:spChg>
       </pc:sldChg>
-      <pc:sldChg chg="addSp modSp">
-        <pc:chgData name="Josh Clark" userId="038a1c1f14b3b0b8" providerId="LiveId" clId="{22D12D38-05B8-CF4A-B8C6-28B3AD3FB154}" dt="2024-06-17T13:22:45.748" v="22"/>
+      <pc:sldChg chg="addSp modSp mod">
+        <pc:chgData name="Josh Clark" userId="038a1c1f14b3b0b8" providerId="LiveId" clId="{22D12D38-05B8-CF4A-B8C6-28B3AD3FB154}" dt="2024-06-19T14:12:48.622" v="331" actId="1035"/>
         <pc:sldMkLst>
           <pc:docMk/>
           <pc:sldMk cId="3861928789" sldId="264"/>
         </pc:sldMkLst>
         <pc:spChg chg="add mod">
-          <ac:chgData name="Josh Clark" userId="038a1c1f14b3b0b8" providerId="LiveId" clId="{22D12D38-05B8-CF4A-B8C6-28B3AD3FB154}" dt="2024-06-17T13:22:45.748" v="22"/>
+          <ac:chgData name="Josh Clark" userId="038a1c1f14b3b0b8" providerId="LiveId" clId="{22D12D38-05B8-CF4A-B8C6-28B3AD3FB154}" dt="2024-06-19T14:12:44.390" v="318" actId="1035"/>
           <ac:spMkLst>
             <pc:docMk/>
             <pc:sldMk cId="3861928789" sldId="264"/>
             <ac:spMk id="2" creationId="{4718CF75-FB99-08AF-FB51-0D4EE66093D8}"/>
+          </ac:spMkLst>
+        </pc:spChg>
+        <pc:spChg chg="add mod">
+          <ac:chgData name="Josh Clark" userId="038a1c1f14b3b0b8" providerId="LiveId" clId="{22D12D38-05B8-CF4A-B8C6-28B3AD3FB154}" dt="2024-06-19T14:12:48.622" v="331" actId="1035"/>
+          <ac:spMkLst>
+            <pc:docMk/>
+            <pc:sldMk cId="3861928789" sldId="264"/>
+            <ac:spMk id="3" creationId="{8B601A76-880A-3BF1-AF68-43A3E09A6A9F}"/>
           </ac:spMkLst>
         </pc:spChg>
       </pc:sldChg>
@@ -8839,7 +8863,7 @@
         </p:nvSpPr>
         <p:spPr>
           <a:xfrm>
-            <a:off x="588306" y="10873677"/>
+            <a:off x="588306" y="10214461"/>
             <a:ext cx="23207387" cy="1792871"/>
           </a:xfrm>
           <a:prstGeom prst="rect">
@@ -8937,6 +8961,138 @@
               <a:solidFill>
                 <a:schemeClr val="accent1"/>
               </a:solidFill>
+            </a:endParaRPr>
+          </a:p>
+        </p:txBody>
+      </p:sp>
+      <p:sp>
+        <p:nvSpPr>
+          <p:cNvPr id="3" name="Google Shape;55;p1">
+            <a:extLst>
+              <a:ext uri="{FF2B5EF4-FFF2-40B4-BE49-F238E27FC236}">
+                <a16:creationId xmlns:a16="http://schemas.microsoft.com/office/drawing/2014/main" id="{AF5C6C2C-2BC2-7F40-14E7-FB47D2ACBB4E}"/>
+              </a:ext>
+            </a:extLst>
+          </p:cNvPr>
+          <p:cNvSpPr txBox="1"/>
+          <p:nvPr/>
+        </p:nvSpPr>
+        <p:spPr>
+          <a:xfrm>
+            <a:off x="740706" y="11323789"/>
+            <a:ext cx="23207387" cy="1792871"/>
+          </a:xfrm>
+          <a:prstGeom prst="rect">
+            <a:avLst/>
+          </a:prstGeom>
+          <a:noFill/>
+          <a:ln>
+            <a:noFill/>
+          </a:ln>
+        </p:spPr>
+        <p:txBody>
+          <a:bodyPr spcFirstLastPara="1" wrap="square" lIns="243775" tIns="243775" rIns="243775" bIns="243775" anchor="ctr" anchorCtr="0">
+            <a:normAutofit/>
+          </a:bodyPr>
+          <a:lstStyle/>
+          <a:p>
+            <a:pPr marL="0" marR="0" lvl="0" indent="0" algn="ctr" rtl="0">
+              <a:lnSpc>
+                <a:spcPct val="100000"/>
+              </a:lnSpc>
+              <a:spcBef>
+                <a:spcPts val="0"/>
+              </a:spcBef>
+              <a:spcAft>
+                <a:spcPts val="0"/>
+              </a:spcAft>
+              <a:buClr>
+                <a:srgbClr val="00B400"/>
+              </a:buClr>
+              <a:buSzPts val="10000"/>
+              <a:buFont typeface="Arial"/>
+              <a:buNone/>
+            </a:pPr>
+            <a:r>
+              <a:rPr lang="en-US" sz="6000" b="1" i="0" u="none" strike="noStrike" cap="none" dirty="0">
+                <a:solidFill>
+                  <a:schemeClr val="accent1"/>
+                </a:solidFill>
+                <a:latin typeface="Arial"/>
+                <a:ea typeface="Arial"/>
+                <a:cs typeface="Arial"/>
+                <a:sym typeface="Arial"/>
+              </a:rPr>
+              <a:t>https://</a:t>
+            </a:r>
+            <a:r>
+              <a:rPr lang="en-US" sz="6000" b="1" i="0" u="none" strike="noStrike" cap="none" dirty="0" err="1">
+                <a:solidFill>
+                  <a:schemeClr val="accent1"/>
+                </a:solidFill>
+                <a:latin typeface="Arial"/>
+                <a:ea typeface="Arial"/>
+                <a:cs typeface="Arial"/>
+                <a:sym typeface="Arial"/>
+              </a:rPr>
+              <a:t>meet.google.com</a:t>
+            </a:r>
+            <a:r>
+              <a:rPr lang="en-US" sz="6000" b="1" i="0" u="none" strike="noStrike" cap="none" dirty="0">
+                <a:solidFill>
+                  <a:schemeClr val="accent1"/>
+                </a:solidFill>
+                <a:latin typeface="Arial"/>
+                <a:ea typeface="Arial"/>
+                <a:cs typeface="Arial"/>
+                <a:sym typeface="Arial"/>
+              </a:rPr>
+              <a:t>/aua-</a:t>
+            </a:r>
+            <a:r>
+              <a:rPr lang="en-US" sz="6000" b="1" i="0" u="none" strike="noStrike" cap="none" dirty="0" err="1">
+                <a:solidFill>
+                  <a:schemeClr val="accent1"/>
+                </a:solidFill>
+                <a:latin typeface="Arial"/>
+                <a:ea typeface="Arial"/>
+                <a:cs typeface="Arial"/>
+                <a:sym typeface="Arial"/>
+              </a:rPr>
+              <a:t>yzwd</a:t>
+            </a:r>
+            <a:r>
+              <a:rPr lang="en-US" sz="6000" b="1" i="0" u="none" strike="noStrike" cap="none" dirty="0">
+                <a:solidFill>
+                  <a:schemeClr val="accent1"/>
+                </a:solidFill>
+                <a:latin typeface="Arial"/>
+                <a:ea typeface="Arial"/>
+                <a:cs typeface="Arial"/>
+                <a:sym typeface="Arial"/>
+              </a:rPr>
+              <a:t>-</a:t>
+            </a:r>
+            <a:r>
+              <a:rPr lang="en-US" sz="6000" b="1" i="0" u="none" strike="noStrike" cap="none" dirty="0" err="1">
+                <a:solidFill>
+                  <a:schemeClr val="accent1"/>
+                </a:solidFill>
+                <a:latin typeface="Arial"/>
+                <a:ea typeface="Arial"/>
+                <a:cs typeface="Arial"/>
+                <a:sym typeface="Arial"/>
+              </a:rPr>
+              <a:t>kso</a:t>
+            </a:r>
+            <a:endParaRPr lang="en-US" sz="6000" b="1" i="0" u="none" strike="noStrike" cap="none" dirty="0">
+              <a:solidFill>
+                <a:schemeClr val="accent1"/>
+              </a:solidFill>
+              <a:latin typeface="Arial"/>
+              <a:ea typeface="Arial"/>
+              <a:cs typeface="Arial"/>
+              <a:sym typeface="Arial"/>
             </a:endParaRPr>
           </a:p>
         </p:txBody>
@@ -11193,7 +11349,7 @@
         </p:nvSpPr>
         <p:spPr>
           <a:xfrm>
-            <a:off x="588306" y="10873677"/>
+            <a:off x="588306" y="9640302"/>
             <a:ext cx="23207387" cy="1792871"/>
           </a:xfrm>
           <a:prstGeom prst="rect">
@@ -11291,6 +11447,138 @@
               <a:solidFill>
                 <a:schemeClr val="accent1"/>
               </a:solidFill>
+            </a:endParaRPr>
+          </a:p>
+        </p:txBody>
+      </p:sp>
+      <p:sp>
+        <p:nvSpPr>
+          <p:cNvPr id="3" name="Google Shape;55;p1">
+            <a:extLst>
+              <a:ext uri="{FF2B5EF4-FFF2-40B4-BE49-F238E27FC236}">
+                <a16:creationId xmlns:a16="http://schemas.microsoft.com/office/drawing/2014/main" id="{8B601A76-880A-3BF1-AF68-43A3E09A6A9F}"/>
+              </a:ext>
+            </a:extLst>
+          </p:cNvPr>
+          <p:cNvSpPr txBox="1"/>
+          <p:nvPr/>
+        </p:nvSpPr>
+        <p:spPr>
+          <a:xfrm>
+            <a:off x="740706" y="10749634"/>
+            <a:ext cx="23207387" cy="1792871"/>
+          </a:xfrm>
+          <a:prstGeom prst="rect">
+            <a:avLst/>
+          </a:prstGeom>
+          <a:noFill/>
+          <a:ln>
+            <a:noFill/>
+          </a:ln>
+        </p:spPr>
+        <p:txBody>
+          <a:bodyPr spcFirstLastPara="1" wrap="square" lIns="243775" tIns="243775" rIns="243775" bIns="243775" anchor="ctr" anchorCtr="0">
+            <a:normAutofit/>
+          </a:bodyPr>
+          <a:lstStyle/>
+          <a:p>
+            <a:pPr marL="0" marR="0" lvl="0" indent="0" algn="ctr" rtl="0">
+              <a:lnSpc>
+                <a:spcPct val="100000"/>
+              </a:lnSpc>
+              <a:spcBef>
+                <a:spcPts val="0"/>
+              </a:spcBef>
+              <a:spcAft>
+                <a:spcPts val="0"/>
+              </a:spcAft>
+              <a:buClr>
+                <a:srgbClr val="00B400"/>
+              </a:buClr>
+              <a:buSzPts val="10000"/>
+              <a:buFont typeface="Arial"/>
+              <a:buNone/>
+            </a:pPr>
+            <a:r>
+              <a:rPr lang="en-US" sz="6000" b="1" i="0" u="none" strike="noStrike" cap="none" dirty="0">
+                <a:solidFill>
+                  <a:schemeClr val="accent1"/>
+                </a:solidFill>
+                <a:latin typeface="Arial"/>
+                <a:ea typeface="Arial"/>
+                <a:cs typeface="Arial"/>
+                <a:sym typeface="Arial"/>
+              </a:rPr>
+              <a:t>https://</a:t>
+            </a:r>
+            <a:r>
+              <a:rPr lang="en-US" sz="6000" b="1" i="0" u="none" strike="noStrike" cap="none" dirty="0" err="1">
+                <a:solidFill>
+                  <a:schemeClr val="accent1"/>
+                </a:solidFill>
+                <a:latin typeface="Arial"/>
+                <a:ea typeface="Arial"/>
+                <a:cs typeface="Arial"/>
+                <a:sym typeface="Arial"/>
+              </a:rPr>
+              <a:t>meet.google.com</a:t>
+            </a:r>
+            <a:r>
+              <a:rPr lang="en-US" sz="6000" b="1" i="0" u="none" strike="noStrike" cap="none" dirty="0">
+                <a:solidFill>
+                  <a:schemeClr val="accent1"/>
+                </a:solidFill>
+                <a:latin typeface="Arial"/>
+                <a:ea typeface="Arial"/>
+                <a:cs typeface="Arial"/>
+                <a:sym typeface="Arial"/>
+              </a:rPr>
+              <a:t>/aua-</a:t>
+            </a:r>
+            <a:r>
+              <a:rPr lang="en-US" sz="6000" b="1" i="0" u="none" strike="noStrike" cap="none" dirty="0" err="1">
+                <a:solidFill>
+                  <a:schemeClr val="accent1"/>
+                </a:solidFill>
+                <a:latin typeface="Arial"/>
+                <a:ea typeface="Arial"/>
+                <a:cs typeface="Arial"/>
+                <a:sym typeface="Arial"/>
+              </a:rPr>
+              <a:t>yzwd</a:t>
+            </a:r>
+            <a:r>
+              <a:rPr lang="en-US" sz="6000" b="1" i="0" u="none" strike="noStrike" cap="none" dirty="0">
+                <a:solidFill>
+                  <a:schemeClr val="accent1"/>
+                </a:solidFill>
+                <a:latin typeface="Arial"/>
+                <a:ea typeface="Arial"/>
+                <a:cs typeface="Arial"/>
+                <a:sym typeface="Arial"/>
+              </a:rPr>
+              <a:t>-</a:t>
+            </a:r>
+            <a:r>
+              <a:rPr lang="en-US" sz="6000" b="1" i="0" u="none" strike="noStrike" cap="none" dirty="0" err="1">
+                <a:solidFill>
+                  <a:schemeClr val="accent1"/>
+                </a:solidFill>
+                <a:latin typeface="Arial"/>
+                <a:ea typeface="Arial"/>
+                <a:cs typeface="Arial"/>
+                <a:sym typeface="Arial"/>
+              </a:rPr>
+              <a:t>kso</a:t>
+            </a:r>
+            <a:endParaRPr lang="en-US" sz="6000" b="1" i="0" u="none" strike="noStrike" cap="none" dirty="0">
+              <a:solidFill>
+                <a:schemeClr val="accent1"/>
+              </a:solidFill>
+              <a:latin typeface="Arial"/>
+              <a:ea typeface="Arial"/>
+              <a:cs typeface="Arial"/>
+              <a:sym typeface="Arial"/>
             </a:endParaRPr>
           </a:p>
         </p:txBody>

</xml_diff>

<commit_message>
slide 2 spacing looked weird
</commit_message>
<xml_diff>
--- a/PacketGuidedOptimization_Sharkfest2024_JClark.pptx
+++ b/PacketGuidedOptimization_Sharkfest2024_JClark.pptx
@@ -275,7 +275,7 @@
       <p15:sldGuideLst xmlns:p15="http://schemas.microsoft.com/office/powerpoint/2012/main"/>
     </p:ext>
     <p:ext uri="GoogleSlidesCustomDataVersion2">
-      <go:slidesCustomData xmlns="" xmlns:mc="http://schemas.openxmlformats.org/markup-compatibility/2006" xmlns:mv="urn:schemas-microsoft-com:mac:vml" xmlns:c="http://schemas.openxmlformats.org/drawingml/2006/chart" xmlns:dgm="http://schemas.openxmlformats.org/drawingml/2006/diagram" xmlns:o="urn:schemas-microsoft-com:office:office" xmlns:v="urn:schemas-microsoft-com:vml" xmlns:pvml="urn:schemas-microsoft-com:office:powerpoint" xmlns:com="http://schemas.openxmlformats.org/drawingml/2006/compatibility" xmlns:p14="http://schemas.microsoft.com/office/powerpoint/2010/main" xmlns:p15="http://schemas.microsoft.com/office/powerpoint/2012/main" xmlns:ahyp="http://schemas.microsoft.com/office/drawing/2018/hyperlinkcolor" xmlns:go="http://customooxmlschemas.google.com/" r:id="rId33" roundtripDataSignature="AMtx7mga90o+t5cU2KXXlS3PkTE3oVrXtA=="/>
+      <go:slidesCustomData xmlns:go="http://customooxmlschemas.google.com/" xmlns:ahyp="http://schemas.microsoft.com/office/drawing/2018/hyperlinkcolor" xmlns:p15="http://schemas.microsoft.com/office/powerpoint/2012/main" xmlns:p14="http://schemas.microsoft.com/office/powerpoint/2010/main" xmlns:com="http://schemas.openxmlformats.org/drawingml/2006/compatibility" xmlns:pvml="urn:schemas-microsoft-com:office:powerpoint" xmlns:v="urn:schemas-microsoft-com:vml" xmlns:o="urn:schemas-microsoft-com:office:office" xmlns:dgm="http://schemas.openxmlformats.org/drawingml/2006/diagram" xmlns:c="http://schemas.openxmlformats.org/drawingml/2006/chart" xmlns:mv="urn:schemas-microsoft-com:mac:vml" xmlns:mc="http://schemas.openxmlformats.org/markup-compatibility/2006" xmlns="" r:id="rId33" roundtripDataSignature="AMtx7mga90o+t5cU2KXXlS3PkTE3oVrXtA=="/>
     </p:ext>
   </p:extLst>
 </p:presentation>
@@ -294,7 +294,7 @@
   <pc:docChgLst>
     <pc:chgData name="Josh Clark" userId="038a1c1f14b3b0b8" providerId="LiveId" clId="{22D12D38-05B8-CF4A-B8C6-28B3AD3FB154}"/>
     <pc:docChg chg="undo custSel addSld modSld">
-      <pc:chgData name="Josh Clark" userId="038a1c1f14b3b0b8" providerId="LiveId" clId="{22D12D38-05B8-CF4A-B8C6-28B3AD3FB154}" dt="2024-06-19T14:12:48.622" v="331" actId="1035"/>
+      <pc:chgData name="Josh Clark" userId="038a1c1f14b3b0b8" providerId="LiveId" clId="{22D12D38-05B8-CF4A-B8C6-28B3AD3FB154}" dt="2024-06-20T12:59:08.377" v="351" actId="1036"/>
       <pc:docMkLst>
         <pc:docMk/>
       </pc:docMkLst>
@@ -354,7 +354,7 @@
         </pc:spChg>
       </pc:sldChg>
       <pc:sldChg chg="addSp modSp mod">
-        <pc:chgData name="Josh Clark" userId="038a1c1f14b3b0b8" providerId="LiveId" clId="{22D12D38-05B8-CF4A-B8C6-28B3AD3FB154}" dt="2024-06-19T14:12:48.622" v="331" actId="1035"/>
+        <pc:chgData name="Josh Clark" userId="038a1c1f14b3b0b8" providerId="LiveId" clId="{22D12D38-05B8-CF4A-B8C6-28B3AD3FB154}" dt="2024-06-20T12:59:08.377" v="351" actId="1036"/>
         <pc:sldMkLst>
           <pc:docMk/>
           <pc:sldMk cId="3861928789" sldId="264"/>
@@ -373,6 +373,14 @@
             <pc:docMk/>
             <pc:sldMk cId="3861928789" sldId="264"/>
             <ac:spMk id="3" creationId="{8B601A76-880A-3BF1-AF68-43A3E09A6A9F}"/>
+          </ac:spMkLst>
+        </pc:spChg>
+        <pc:spChg chg="mod">
+          <ac:chgData name="Josh Clark" userId="038a1c1f14b3b0b8" providerId="LiveId" clId="{22D12D38-05B8-CF4A-B8C6-28B3AD3FB154}" dt="2024-06-20T12:59:08.377" v="351" actId="1036"/>
+          <ac:spMkLst>
+            <pc:docMk/>
+            <pc:sldMk cId="3861928789" sldId="264"/>
+            <ac:spMk id="67" creationId="{00000000-0000-0000-0000-000000000000}"/>
           </ac:spMkLst>
         </pc:spChg>
       </pc:sldChg>
@@ -11174,7 +11182,7 @@
         </p:nvSpPr>
         <p:spPr>
           <a:xfrm>
-            <a:off x="724555" y="3658607"/>
+            <a:off x="724555" y="2710340"/>
             <a:ext cx="22934890" cy="7863634"/>
           </a:xfrm>
           <a:prstGeom prst="rect">

</xml_diff>